<commit_message>
Final (I hope) error corrections for ATPESC presentation.
</commit_message>
<xml_diff>
--- a/presentations/final-presentations/2020-08-06-atpesc/10-summary.pptx
+++ b/presentations/final-presentations/2020-08-06-atpesc/10-summary.pptx
@@ -265,7 +265,7 @@
           <a:p>
             <a:fld id="{0B842F42-2CE9-4E35-95C1-410DC08A50B1}" type="datetimeFigureOut">
               <a:rPr lang="en-US" smtClean="0"/>
-              <a:t>8/5/2020</a:t>
+              <a:t>8/6/2020</a:t>
             </a:fld>
             <a:endParaRPr lang="en-US"/>
           </a:p>
@@ -430,7 +430,7 @@
           <a:p>
             <a:fld id="{6F282904-F315-4730-8D91-37D99E141A6F}" type="datetimeFigureOut">
               <a:rPr lang="en-US" smtClean="0"/>
-              <a:t>8/5/2020</a:t>
+              <a:t>8/6/2020</a:t>
             </a:fld>
             <a:endParaRPr lang="en-US"/>
           </a:p>
@@ -4956,7 +4956,7 @@
               </a:r>
               <a:r>
                 <a:rPr lang="en-US" dirty="0">
-                  <a:hlinkClick r:id="rId4"/>
+                  <a:hlinkClick r:id="rId2"/>
                 </a:rPr>
                 <a:t>BSSw.io</a:t>
               </a:r>
@@ -8227,21 +8227,6 @@
 </file>
 
 <file path=customXml/item1.xml><?xml version="1.0" encoding="utf-8"?>
-<p:properties xmlns:p="http://schemas.microsoft.com/office/2006/metadata/properties" xmlns:xsi="http://www.w3.org/2001/XMLSchema-instance" xmlns:pc="http://schemas.microsoft.com/office/infopath/2007/PartnerControls">
-  <documentManagement/>
-</p:properties>
-</file>
-
-<file path=customXml/item2.xml><?xml version="1.0" encoding="utf-8"?>
-<?mso-contentType ?>
-<FormTemplates xmlns="http://schemas.microsoft.com/sharepoint/v3/contenttype/forms">
-  <Display>DocumentLibraryForm</Display>
-  <Edit>DocumentLibraryForm</Edit>
-  <New>DocumentLibraryForm</New>
-</FormTemplates>
-</file>
-
-<file path=customXml/item3.xml><?xml version="1.0" encoding="utf-8"?>
 <ct:contentTypeSchema xmlns:ct="http://schemas.microsoft.com/office/2006/metadata/contentType" xmlns:ma="http://schemas.microsoft.com/office/2006/metadata/properties/metaAttributes" ct:_="" ma:_="" ma:contentTypeName="Document" ma:contentTypeID="0x010100565464437F680748A68B85EB6594EA7D" ma:contentTypeVersion="0" ma:contentTypeDescription="Create a new document." ma:contentTypeScope="" ma:versionID="fe3f4dd58d5914c51cfc6deaa8ad845c">
   <xsd:schema xmlns:xsd="http://www.w3.org/2001/XMLSchema" xmlns:p="http://schemas.microsoft.com/office/2006/metadata/properties" targetNamespace="http://schemas.microsoft.com/office/2006/metadata/properties" ma:root="true" ma:fieldsID="4aeb20c0e3442673af7ee10786458764">
     <xsd:element name="properties">
@@ -8290,17 +8275,32 @@
 </ct:contentTypeSchema>
 </file>
 
+<file path=customXml/item2.xml><?xml version="1.0" encoding="utf-8"?>
+<?mso-contentType ?>
+<FormTemplates xmlns="http://schemas.microsoft.com/sharepoint/v3/contenttype/forms">
+  <Display>DocumentLibraryForm</Display>
+  <Edit>DocumentLibraryForm</Edit>
+  <New>DocumentLibraryForm</New>
+</FormTemplates>
+</file>
+
+<file path=customXml/item3.xml><?xml version="1.0" encoding="utf-8"?>
+<p:properties xmlns:p="http://schemas.microsoft.com/office/2006/metadata/properties" xmlns:xsi="http://www.w3.org/2001/XMLSchema-instance" xmlns:pc="http://schemas.microsoft.com/office/infopath/2007/PartnerControls">
+  <documentManagement/>
+</p:properties>
+</file>
+
 <file path=customXml/itemProps1.xml><?xml version="1.0" encoding="utf-8"?>
-<ds:datastoreItem xmlns:ds="http://schemas.openxmlformats.org/officeDocument/2006/customXml" ds:itemID="{A50EC660-24D0-43A0-AE5E-E274115E726B}">
+<ds:datastoreItem xmlns:ds="http://schemas.openxmlformats.org/officeDocument/2006/customXml" ds:itemID="{E8DB7DEB-074E-4EE8-9B6E-FD277323109C}">
   <ds:schemaRefs>
+    <ds:schemaRef ds:uri="http://schemas.microsoft.com/office/2006/metadata/contentType"/>
+    <ds:schemaRef ds:uri="http://schemas.microsoft.com/office/2006/metadata/properties/metaAttributes"/>
+    <ds:schemaRef ds:uri="http://www.w3.org/2001/XMLSchema"/>
+    <ds:schemaRef ds:uri="http://schemas.microsoft.com/office/2006/metadata/properties"/>
+    <ds:schemaRef ds:uri="http://schemas.openxmlformats.org/package/2006/metadata/core-properties"/>
+    <ds:schemaRef ds:uri="http://purl.org/dc/elements/1.1/"/>
     <ds:schemaRef ds:uri="http://purl.org/dc/terms/"/>
-    <ds:schemaRef ds:uri="http://schemas.openxmlformats.org/package/2006/metadata/core-properties"/>
-    <ds:schemaRef ds:uri="http://schemas.microsoft.com/office/2006/documentManagement/types"/>
-    <ds:schemaRef ds:uri="http://purl.org/dc/elements/1.1/"/>
-    <ds:schemaRef ds:uri="http://schemas.microsoft.com/office/2006/metadata/properties"/>
-    <ds:schemaRef ds:uri="http://www.w3.org/XML/1998/namespace"/>
-    <ds:schemaRef ds:uri="http://purl.org/dc/dcmitype/"/>
-    <ds:schemaRef ds:uri="http://schemas.microsoft.com/office/infopath/2007/PartnerControls"/>
+    <ds:schemaRef ds:uri="http://schemas.microsoft.com/office/internal/2005/internalDocumentation"/>
   </ds:schemaRefs>
 </ds:datastoreItem>
 </file>
@@ -8314,16 +8314,16 @@
 </file>
 
 <file path=customXml/itemProps3.xml><?xml version="1.0" encoding="utf-8"?>
-<ds:datastoreItem xmlns:ds="http://schemas.openxmlformats.org/officeDocument/2006/customXml" ds:itemID="{E8DB7DEB-074E-4EE8-9B6E-FD277323109C}">
+<ds:datastoreItem xmlns:ds="http://schemas.openxmlformats.org/officeDocument/2006/customXml" ds:itemID="{A50EC660-24D0-43A0-AE5E-E274115E726B}">
   <ds:schemaRefs>
-    <ds:schemaRef ds:uri="http://schemas.microsoft.com/office/2006/metadata/contentType"/>
-    <ds:schemaRef ds:uri="http://schemas.microsoft.com/office/2006/metadata/properties/metaAttributes"/>
-    <ds:schemaRef ds:uri="http://www.w3.org/2001/XMLSchema"/>
+    <ds:schemaRef ds:uri="http://purl.org/dc/terms/"/>
+    <ds:schemaRef ds:uri="http://schemas.openxmlformats.org/package/2006/metadata/core-properties"/>
+    <ds:schemaRef ds:uri="http://schemas.microsoft.com/office/2006/documentManagement/types"/>
+    <ds:schemaRef ds:uri="http://purl.org/dc/elements/1.1/"/>
     <ds:schemaRef ds:uri="http://schemas.microsoft.com/office/2006/metadata/properties"/>
-    <ds:schemaRef ds:uri="http://schemas.openxmlformats.org/package/2006/metadata/core-properties"/>
-    <ds:schemaRef ds:uri="http://purl.org/dc/elements/1.1/"/>
-    <ds:schemaRef ds:uri="http://purl.org/dc/terms/"/>
-    <ds:schemaRef ds:uri="http://schemas.microsoft.com/office/internal/2005/internalDocumentation"/>
+    <ds:schemaRef ds:uri="http://www.w3.org/XML/1998/namespace"/>
+    <ds:schemaRef ds:uri="http://purl.org/dc/dcmitype/"/>
+    <ds:schemaRef ds:uri="http://schemas.microsoft.com/office/infopath/2007/PartnerControls"/>
   </ds:schemaRefs>
 </ds:datastoreItem>
 </file>
</xml_diff>